<commit_message>
Deployed 36de64b with MkDocs version: 0.17.5
</commit_message>
<xml_diff>
--- a/materials/day3/files/osgus19-day3-part1-license-modules.pptx
+++ b/materials/day3/files/osgus19-day3-part1-license-modules.pptx
@@ -6599,6 +6599,27 @@
               </a:rPr>
               <a:t> compiler (mcc) </a:t>
             </a:r>
+            <a:r>
+              <a:rPr lang="en-US" sz="2800" dirty="0" smtClean="0">
+                <a:latin typeface="Arial" charset="0"/>
+                <a:ea typeface="ＭＳ Ｐゴシック" charset="0"/>
+                <a:cs typeface="ＭＳ Ｐゴシック" charset="0"/>
+              </a:rPr>
+              <a:t>on the same operating system </a:t>
+            </a:r>
+            <a:r>
+              <a:rPr lang="en-US" sz="2800" smtClean="0">
+                <a:latin typeface="Arial" charset="0"/>
+                <a:ea typeface="ＭＳ Ｐゴシック" charset="0"/>
+                <a:cs typeface="ＭＳ Ｐゴシック" charset="0"/>
+              </a:rPr>
+              <a:t>(Linux)</a:t>
+            </a:r>
+            <a:endParaRPr lang="en-US" sz="2800" dirty="0">
+              <a:latin typeface="Arial" charset="0"/>
+              <a:ea typeface="ＭＳ Ｐゴシック" charset="0"/>
+              <a:cs typeface="ＭＳ Ｐゴシック" charset="0"/>
+            </a:endParaRPr>
           </a:p>
           <a:p>
             <a:pPr lvl="1"/>
@@ -9351,17 +9372,7 @@
                 <a:latin typeface="Courier New"/>
                 <a:cs typeface="Courier New"/>
               </a:rPr>
-              <a:t>[~]$ </a:t>
-            </a:r>
-            <a:r>
-              <a:rPr lang="en-US" sz="2000" b="1" dirty="0" smtClean="0">
-                <a:solidFill>
-                  <a:schemeClr val="bg1"/>
-                </a:solidFill>
-                <a:latin typeface="Courier New"/>
-                <a:cs typeface="Courier New"/>
-              </a:rPr>
-              <a:t>module load </a:t>
+              <a:t>[~]$ module load </a:t>
             </a:r>
             <a:r>
               <a:rPr lang="en-US" sz="2000" b="1" dirty="0" err="1">

</xml_diff>